<commit_message>
convergence improved with differing rhos
</commit_message>
<xml_diff>
--- a/Admin/Escape Results.pptx
+++ b/Admin/Escape Results.pptx
@@ -13,10 +13,11 @@
     <p:sldId id="259" r:id="rId10"/>
     <p:sldId id="260" r:id="rId11"/>
     <p:sldId id="261" r:id="rId12"/>
-    <p:sldId id="264" r:id="rId13"/>
-    <p:sldId id="265" r:id="rId14"/>
-    <p:sldId id="266" r:id="rId15"/>
-    <p:sldId id="271" r:id="rId16"/>
+    <p:sldId id="272" r:id="rId13"/>
+    <p:sldId id="273" r:id="rId14"/>
+    <p:sldId id="275" r:id="rId15"/>
+    <p:sldId id="265" r:id="rId16"/>
+    <p:sldId id="266" r:id="rId17"/>
   </p:sldIdLst>
   <p:sldSz cx="9144000" cy="5143500" type="screen16x9"/>
   <p:notesSz cx="6858000" cy="9144000"/>
@@ -137,7 +138,7 @@
 <file path=ppt/revisionInfo.xml><?xml version="1.0" encoding="utf-8"?>
 <p1510:revInfo xmlns:a="http://schemas.openxmlformats.org/drawingml/2006/main" xmlns:r="http://schemas.openxmlformats.org/officeDocument/2006/relationships" xmlns:p1510="http://schemas.microsoft.com/office/powerpoint/2015/10/main">
   <p1510:revLst>
-    <p1510:client id="{F817BABB-CBA7-448D-9D58-A32A2DB79D75}" v="117" dt="2020-10-05T16:23:27.035"/>
+    <p1510:client id="{F817BABB-CBA7-448D-9D58-A32A2DB79D75}" v="156" dt="2020-10-05T18:05:43.250"/>
   </p1510:revLst>
 </p1510:revInfo>
 </file>
@@ -147,10 +148,33 @@
   <pc:docChgLst>
     <pc:chgData name="Sandeep Prakash" userId="5b362298-5542-405f-bec6-c788e8033232" providerId="ADAL" clId="{F817BABB-CBA7-448D-9D58-A32A2DB79D75}"/>
     <pc:docChg chg="undo custSel addSld delSld modSld sldOrd modMainMaster">
-      <pc:chgData name="Sandeep Prakash" userId="5b362298-5542-405f-bec6-c788e8033232" providerId="ADAL" clId="{F817BABB-CBA7-448D-9D58-A32A2DB79D75}" dt="2020-10-05T16:23:27.035" v="2169" actId="20577"/>
+      <pc:chgData name="Sandeep Prakash" userId="5b362298-5542-405f-bec6-c788e8033232" providerId="ADAL" clId="{F817BABB-CBA7-448D-9D58-A32A2DB79D75}" dt="2020-10-05T18:07:10.012" v="2814" actId="2696"/>
       <pc:docMkLst>
         <pc:docMk/>
       </pc:docMkLst>
+      <pc:sldChg chg="modSp">
+        <pc:chgData name="Sandeep Prakash" userId="5b362298-5542-405f-bec6-c788e8033232" providerId="ADAL" clId="{F817BABB-CBA7-448D-9D58-A32A2DB79D75}" dt="2020-10-05T17:58:44.501" v="2645" actId="20577"/>
+        <pc:sldMkLst>
+          <pc:docMk/>
+          <pc:sldMk cId="3243102052" sldId="256"/>
+        </pc:sldMkLst>
+        <pc:spChg chg="mod">
+          <ac:chgData name="Sandeep Prakash" userId="5b362298-5542-405f-bec6-c788e8033232" providerId="ADAL" clId="{F817BABB-CBA7-448D-9D58-A32A2DB79D75}" dt="2020-10-05T17:58:33.374" v="2644" actId="403"/>
+          <ac:spMkLst>
+            <pc:docMk/>
+            <pc:sldMk cId="3243102052" sldId="256"/>
+            <ac:spMk id="2" creationId="{00000000-0000-0000-0000-000000000000}"/>
+          </ac:spMkLst>
+        </pc:spChg>
+        <pc:spChg chg="mod">
+          <ac:chgData name="Sandeep Prakash" userId="5b362298-5542-405f-bec6-c788e8033232" providerId="ADAL" clId="{F817BABB-CBA7-448D-9D58-A32A2DB79D75}" dt="2020-10-05T17:58:44.501" v="2645" actId="20577"/>
+          <ac:spMkLst>
+            <pc:docMk/>
+            <pc:sldMk cId="3243102052" sldId="256"/>
+            <ac:spMk id="3" creationId="{00000000-0000-0000-0000-000000000000}"/>
+          </ac:spMkLst>
+        </pc:spChg>
+      </pc:sldChg>
       <pc:sldChg chg="del">
         <pc:chgData name="Sandeep Prakash" userId="5b362298-5542-405f-bec6-c788e8033232" providerId="ADAL" clId="{F817BABB-CBA7-448D-9D58-A32A2DB79D75}" dt="2020-10-04T17:00:05.590" v="659" actId="2696"/>
         <pc:sldMkLst>
@@ -526,15 +550,15 @@
           </ac:picMkLst>
         </pc:picChg>
       </pc:sldChg>
-      <pc:sldChg chg="add">
-        <pc:chgData name="Sandeep Prakash" userId="5b362298-5542-405f-bec6-c788e8033232" providerId="ADAL" clId="{F817BABB-CBA7-448D-9D58-A32A2DB79D75}" dt="2020-10-04T17:12:35.527" v="1151"/>
+      <pc:sldChg chg="add del">
+        <pc:chgData name="Sandeep Prakash" userId="5b362298-5542-405f-bec6-c788e8033232" providerId="ADAL" clId="{F817BABB-CBA7-448D-9D58-A32A2DB79D75}" dt="2020-10-05T18:07:10.012" v="2814" actId="2696"/>
         <pc:sldMkLst>
           <pc:docMk/>
           <pc:sldMk cId="1448095239" sldId="264"/>
         </pc:sldMkLst>
       </pc:sldChg>
       <pc:sldChg chg="addSp delSp modSp add ord">
-        <pc:chgData name="Sandeep Prakash" userId="5b362298-5542-405f-bec6-c788e8033232" providerId="ADAL" clId="{F817BABB-CBA7-448D-9D58-A32A2DB79D75}" dt="2020-10-05T07:48:30.496" v="2137" actId="1076"/>
+        <pc:chgData name="Sandeep Prakash" userId="5b362298-5542-405f-bec6-c788e8033232" providerId="ADAL" clId="{F817BABB-CBA7-448D-9D58-A32A2DB79D75}" dt="2020-10-05T18:06:15.863" v="2813" actId="20577"/>
         <pc:sldMkLst>
           <pc:docMk/>
           <pc:sldMk cId="1495227828" sldId="265"/>
@@ -548,7 +572,7 @@
           </ac:spMkLst>
         </pc:spChg>
         <pc:spChg chg="mod">
-          <ac:chgData name="Sandeep Prakash" userId="5b362298-5542-405f-bec6-c788e8033232" providerId="ADAL" clId="{F817BABB-CBA7-448D-9D58-A32A2DB79D75}" dt="2020-10-04T17:16:40.819" v="1208" actId="20577"/>
+          <ac:chgData name="Sandeep Prakash" userId="5b362298-5542-405f-bec6-c788e8033232" providerId="ADAL" clId="{F817BABB-CBA7-448D-9D58-A32A2DB79D75}" dt="2020-10-05T18:06:15.863" v="2813" actId="20577"/>
           <ac:spMkLst>
             <pc:docMk/>
             <pc:sldMk cId="1495227828" sldId="265"/>
@@ -871,12 +895,246 @@
           </ac:picMkLst>
         </pc:picChg>
       </pc:sldChg>
-      <pc:sldChg chg="add">
-        <pc:chgData name="Sandeep Prakash" userId="5b362298-5542-405f-bec6-c788e8033232" providerId="ADAL" clId="{F817BABB-CBA7-448D-9D58-A32A2DB79D75}" dt="2020-10-04T17:47:26.020" v="2007"/>
+      <pc:sldChg chg="add del">
+        <pc:chgData name="Sandeep Prakash" userId="5b362298-5542-405f-bec6-c788e8033232" providerId="ADAL" clId="{F817BABB-CBA7-448D-9D58-A32A2DB79D75}" dt="2020-10-05T18:05:44.804" v="2789" actId="2696"/>
         <pc:sldMkLst>
           <pc:docMk/>
           <pc:sldMk cId="785515841" sldId="271"/>
         </pc:sldMkLst>
+      </pc:sldChg>
+      <pc:sldChg chg="addSp delSp modSp add">
+        <pc:chgData name="Sandeep Prakash" userId="5b362298-5542-405f-bec6-c788e8033232" providerId="ADAL" clId="{F817BABB-CBA7-448D-9D58-A32A2DB79D75}" dt="2020-10-05T17:42:37.508" v="2461" actId="404"/>
+        <pc:sldMkLst>
+          <pc:docMk/>
+          <pc:sldMk cId="3394912370" sldId="272"/>
+        </pc:sldMkLst>
+        <pc:spChg chg="mod">
+          <ac:chgData name="Sandeep Prakash" userId="5b362298-5542-405f-bec6-c788e8033232" providerId="ADAL" clId="{F817BABB-CBA7-448D-9D58-A32A2DB79D75}" dt="2020-10-05T17:36:56.786" v="2178" actId="20577"/>
+          <ac:spMkLst>
+            <pc:docMk/>
+            <pc:sldMk cId="3394912370" sldId="272"/>
+            <ac:spMk id="2" creationId="{5D3E7CC4-EC27-442F-BA09-58046DBB03D8}"/>
+          </ac:spMkLst>
+        </pc:spChg>
+        <pc:spChg chg="mod">
+          <ac:chgData name="Sandeep Prakash" userId="5b362298-5542-405f-bec6-c788e8033232" providerId="ADAL" clId="{F817BABB-CBA7-448D-9D58-A32A2DB79D75}" dt="2020-10-05T17:42:37.508" v="2461" actId="404"/>
+          <ac:spMkLst>
+            <pc:docMk/>
+            <pc:sldMk cId="3394912370" sldId="272"/>
+            <ac:spMk id="3" creationId="{9D6F03DC-621B-4568-9468-5811EF9BE1CB}"/>
+          </ac:spMkLst>
+        </pc:spChg>
+        <pc:graphicFrameChg chg="add del mod">
+          <ac:chgData name="Sandeep Prakash" userId="5b362298-5542-405f-bec6-c788e8033232" providerId="ADAL" clId="{F817BABB-CBA7-448D-9D58-A32A2DB79D75}" dt="2020-10-05T17:37:29.828" v="2182"/>
+          <ac:graphicFrameMkLst>
+            <pc:docMk/>
+            <pc:sldMk cId="3394912370" sldId="272"/>
+            <ac:graphicFrameMk id="4" creationId="{32689896-72ED-488C-A8F2-E90FC1421486}"/>
+          </ac:graphicFrameMkLst>
+        </pc:graphicFrameChg>
+        <pc:graphicFrameChg chg="add del mod">
+          <ac:chgData name="Sandeep Prakash" userId="5b362298-5542-405f-bec6-c788e8033232" providerId="ADAL" clId="{F817BABB-CBA7-448D-9D58-A32A2DB79D75}" dt="2020-10-05T17:38:08.377" v="2254"/>
+          <ac:graphicFrameMkLst>
+            <pc:docMk/>
+            <pc:sldMk cId="3394912370" sldId="272"/>
+            <ac:graphicFrameMk id="7" creationId="{76AA6525-5DEF-4F2F-B366-27F116B25546}"/>
+          </ac:graphicFrameMkLst>
+        </pc:graphicFrameChg>
+        <pc:graphicFrameChg chg="add del mod">
+          <ac:chgData name="Sandeep Prakash" userId="5b362298-5542-405f-bec6-c788e8033232" providerId="ADAL" clId="{F817BABB-CBA7-448D-9D58-A32A2DB79D75}" dt="2020-10-05T17:38:48.363" v="2283"/>
+          <ac:graphicFrameMkLst>
+            <pc:docMk/>
+            <pc:sldMk cId="3394912370" sldId="272"/>
+            <ac:graphicFrameMk id="10" creationId="{9DCA6DDC-841A-4B08-B890-0CF3CB4BD596}"/>
+          </ac:graphicFrameMkLst>
+        </pc:graphicFrameChg>
+        <pc:graphicFrameChg chg="add del mod">
+          <ac:chgData name="Sandeep Prakash" userId="5b362298-5542-405f-bec6-c788e8033232" providerId="ADAL" clId="{F817BABB-CBA7-448D-9D58-A32A2DB79D75}" dt="2020-10-05T17:38:56.400" v="2290"/>
+          <ac:graphicFrameMkLst>
+            <pc:docMk/>
+            <pc:sldMk cId="3394912370" sldId="272"/>
+            <ac:graphicFrameMk id="13" creationId="{689D9E01-4C48-4546-8861-60941EE03F63}"/>
+          </ac:graphicFrameMkLst>
+        </pc:graphicFrameChg>
+        <pc:graphicFrameChg chg="add del mod">
+          <ac:chgData name="Sandeep Prakash" userId="5b362298-5542-405f-bec6-c788e8033232" providerId="ADAL" clId="{F817BABB-CBA7-448D-9D58-A32A2DB79D75}" dt="2020-10-05T17:39:10.924" v="2298"/>
+          <ac:graphicFrameMkLst>
+            <pc:docMk/>
+            <pc:sldMk cId="3394912370" sldId="272"/>
+            <ac:graphicFrameMk id="16" creationId="{C4A5C546-DD03-4EF2-825D-10A436C58A41}"/>
+          </ac:graphicFrameMkLst>
+        </pc:graphicFrameChg>
+        <pc:graphicFrameChg chg="add del mod">
+          <ac:chgData name="Sandeep Prakash" userId="5b362298-5542-405f-bec6-c788e8033232" providerId="ADAL" clId="{F817BABB-CBA7-448D-9D58-A32A2DB79D75}" dt="2020-10-05T17:41:08.771" v="2394"/>
+          <ac:graphicFrameMkLst>
+            <pc:docMk/>
+            <pc:sldMk cId="3394912370" sldId="272"/>
+            <ac:graphicFrameMk id="19" creationId="{5737DC1F-3384-4542-BCCC-9924ACB011D3}"/>
+          </ac:graphicFrameMkLst>
+        </pc:graphicFrameChg>
+        <pc:picChg chg="add mod">
+          <ac:chgData name="Sandeep Prakash" userId="5b362298-5542-405f-bec6-c788e8033232" providerId="ADAL" clId="{F817BABB-CBA7-448D-9D58-A32A2DB79D75}" dt="2020-10-05T17:40:17.153" v="2391" actId="1035"/>
+          <ac:picMkLst>
+            <pc:docMk/>
+            <pc:sldMk cId="3394912370" sldId="272"/>
+            <ac:picMk id="6" creationId="{973A046E-5EA9-4269-BF4E-1266B3C53CEC}"/>
+          </ac:picMkLst>
+        </pc:picChg>
+        <pc:picChg chg="add mod ord">
+          <ac:chgData name="Sandeep Prakash" userId="5b362298-5542-405f-bec6-c788e8033232" providerId="ADAL" clId="{F817BABB-CBA7-448D-9D58-A32A2DB79D75}" dt="2020-10-05T17:40:09.941" v="2383" actId="166"/>
+          <ac:picMkLst>
+            <pc:docMk/>
+            <pc:sldMk cId="3394912370" sldId="272"/>
+            <ac:picMk id="9" creationId="{6884FBAB-8D23-446B-BCF0-52560A74BA00}"/>
+          </ac:picMkLst>
+        </pc:picChg>
+        <pc:picChg chg="add del mod">
+          <ac:chgData name="Sandeep Prakash" userId="5b362298-5542-405f-bec6-c788e8033232" providerId="ADAL" clId="{F817BABB-CBA7-448D-9D58-A32A2DB79D75}" dt="2020-10-05T17:38:53.215" v="2287" actId="478"/>
+          <ac:picMkLst>
+            <pc:docMk/>
+            <pc:sldMk cId="3394912370" sldId="272"/>
+            <ac:picMk id="12" creationId="{0100A432-1550-4901-91F7-08CC5C7FAC4E}"/>
+          </ac:picMkLst>
+        </pc:picChg>
+        <pc:picChg chg="add mod">
+          <ac:chgData name="Sandeep Prakash" userId="5b362298-5542-405f-bec6-c788e8033232" providerId="ADAL" clId="{F817BABB-CBA7-448D-9D58-A32A2DB79D75}" dt="2020-10-05T17:39:07.030" v="2295" actId="1076"/>
+          <ac:picMkLst>
+            <pc:docMk/>
+            <pc:sldMk cId="3394912370" sldId="272"/>
+            <ac:picMk id="15" creationId="{444F4641-E084-446C-A037-5F6E19372174}"/>
+          </ac:picMkLst>
+        </pc:picChg>
+        <pc:picChg chg="add mod">
+          <ac:chgData name="Sandeep Prakash" userId="5b362298-5542-405f-bec6-c788e8033232" providerId="ADAL" clId="{F817BABB-CBA7-448D-9D58-A32A2DB79D75}" dt="2020-10-05T17:40:15.585" v="2387" actId="1035"/>
+          <ac:picMkLst>
+            <pc:docMk/>
+            <pc:sldMk cId="3394912370" sldId="272"/>
+            <ac:picMk id="18" creationId="{4668F48C-F399-4803-A7CA-4FE1EA2B3C18}"/>
+          </ac:picMkLst>
+        </pc:picChg>
+        <pc:picChg chg="add del mod">
+          <ac:chgData name="Sandeep Prakash" userId="5b362298-5542-405f-bec6-c788e8033232" providerId="ADAL" clId="{F817BABB-CBA7-448D-9D58-A32A2DB79D75}" dt="2020-10-05T17:41:22.602" v="2398" actId="478"/>
+          <ac:picMkLst>
+            <pc:docMk/>
+            <pc:sldMk cId="3394912370" sldId="272"/>
+            <ac:picMk id="21" creationId="{7D350820-91BC-4031-B738-02B829672675}"/>
+          </ac:picMkLst>
+        </pc:picChg>
+      </pc:sldChg>
+      <pc:sldChg chg="addSp delSp modSp add">
+        <pc:chgData name="Sandeep Prakash" userId="5b362298-5542-405f-bec6-c788e8033232" providerId="ADAL" clId="{F817BABB-CBA7-448D-9D58-A32A2DB79D75}" dt="2020-10-05T18:04:53.823" v="2768" actId="20577"/>
+        <pc:sldMkLst>
+          <pc:docMk/>
+          <pc:sldMk cId="3008920400" sldId="273"/>
+        </pc:sldMkLst>
+        <pc:spChg chg="mod">
+          <ac:chgData name="Sandeep Prakash" userId="5b362298-5542-405f-bec6-c788e8033232" providerId="ADAL" clId="{F817BABB-CBA7-448D-9D58-A32A2DB79D75}" dt="2020-10-05T18:02:10.090" v="2650" actId="5793"/>
+          <ac:spMkLst>
+            <pc:docMk/>
+            <pc:sldMk cId="3008920400" sldId="273"/>
+            <ac:spMk id="2" creationId="{84DD744E-F31D-4403-9249-CDDD67A00FDA}"/>
+          </ac:spMkLst>
+        </pc:spChg>
+        <pc:spChg chg="mod">
+          <ac:chgData name="Sandeep Prakash" userId="5b362298-5542-405f-bec6-c788e8033232" providerId="ADAL" clId="{F817BABB-CBA7-448D-9D58-A32A2DB79D75}" dt="2020-10-05T18:04:53.823" v="2768" actId="20577"/>
+          <ac:spMkLst>
+            <pc:docMk/>
+            <pc:sldMk cId="3008920400" sldId="273"/>
+            <ac:spMk id="3" creationId="{94C8FCE1-F2BD-4F64-90D3-F2625FA8DB0A}"/>
+          </ac:spMkLst>
+        </pc:spChg>
+        <pc:graphicFrameChg chg="add del mod">
+          <ac:chgData name="Sandeep Prakash" userId="5b362298-5542-405f-bec6-c788e8033232" providerId="ADAL" clId="{F817BABB-CBA7-448D-9D58-A32A2DB79D75}" dt="2020-10-05T18:02:23.615" v="2654"/>
+          <ac:graphicFrameMkLst>
+            <pc:docMk/>
+            <pc:sldMk cId="3008920400" sldId="273"/>
+            <ac:graphicFrameMk id="4" creationId="{8CF86538-5B03-4FB0-8D4D-6970DE2A5185}"/>
+          </ac:graphicFrameMkLst>
+        </pc:graphicFrameChg>
+        <pc:graphicFrameChg chg="add del mod">
+          <ac:chgData name="Sandeep Prakash" userId="5b362298-5542-405f-bec6-c788e8033232" providerId="ADAL" clId="{F817BABB-CBA7-448D-9D58-A32A2DB79D75}" dt="2020-10-05T18:02:52.200" v="2668"/>
+          <ac:graphicFrameMkLst>
+            <pc:docMk/>
+            <pc:sldMk cId="3008920400" sldId="273"/>
+            <ac:graphicFrameMk id="9" creationId="{F7323D49-84FA-4B6D-8231-05A9DFDDFABB}"/>
+          </ac:graphicFrameMkLst>
+        </pc:graphicFrameChg>
+        <pc:graphicFrameChg chg="add del mod">
+          <ac:chgData name="Sandeep Prakash" userId="5b362298-5542-405f-bec6-c788e8033232" providerId="ADAL" clId="{F817BABB-CBA7-448D-9D58-A32A2DB79D75}" dt="2020-10-05T18:03:07.610" v="2676"/>
+          <ac:graphicFrameMkLst>
+            <pc:docMk/>
+            <pc:sldMk cId="3008920400" sldId="273"/>
+            <ac:graphicFrameMk id="12" creationId="{9FCBB72E-92D5-4B7F-B563-8FBFEA755B1A}"/>
+          </ac:graphicFrameMkLst>
+        </pc:graphicFrameChg>
+        <pc:picChg chg="add mod">
+          <ac:chgData name="Sandeep Prakash" userId="5b362298-5542-405f-bec6-c788e8033232" providerId="ADAL" clId="{F817BABB-CBA7-448D-9D58-A32A2DB79D75}" dt="2020-10-05T18:04:04.169" v="2688" actId="14100"/>
+          <ac:picMkLst>
+            <pc:docMk/>
+            <pc:sldMk cId="3008920400" sldId="273"/>
+            <ac:picMk id="6" creationId="{7382521A-00E0-45AA-BBEA-845DB37DC04B}"/>
+          </ac:picMkLst>
+        </pc:picChg>
+        <pc:picChg chg="add mod">
+          <ac:chgData name="Sandeep Prakash" userId="5b362298-5542-405f-bec6-c788e8033232" providerId="ADAL" clId="{F817BABB-CBA7-448D-9D58-A32A2DB79D75}" dt="2020-10-05T18:03:57.576" v="2686" actId="14100"/>
+          <ac:picMkLst>
+            <pc:docMk/>
+            <pc:sldMk cId="3008920400" sldId="273"/>
+            <ac:picMk id="8" creationId="{1A830544-5FCE-4B68-B5AE-1E4223B79E58}"/>
+          </ac:picMkLst>
+        </pc:picChg>
+        <pc:picChg chg="add mod">
+          <ac:chgData name="Sandeep Prakash" userId="5b362298-5542-405f-bec6-c788e8033232" providerId="ADAL" clId="{F817BABB-CBA7-448D-9D58-A32A2DB79D75}" dt="2020-10-05T18:04:10.578" v="2718" actId="1038"/>
+          <ac:picMkLst>
+            <pc:docMk/>
+            <pc:sldMk cId="3008920400" sldId="273"/>
+            <ac:picMk id="11" creationId="{CF1E993D-B90C-4D22-BC0C-5989F73F98B3}"/>
+          </ac:picMkLst>
+        </pc:picChg>
+        <pc:picChg chg="add mod">
+          <ac:chgData name="Sandeep Prakash" userId="5b362298-5542-405f-bec6-c788e8033232" providerId="ADAL" clId="{F817BABB-CBA7-448D-9D58-A32A2DB79D75}" dt="2020-10-05T18:04:10.578" v="2718" actId="1038"/>
+          <ac:picMkLst>
+            <pc:docMk/>
+            <pc:sldMk cId="3008920400" sldId="273"/>
+            <ac:picMk id="14" creationId="{28289EDE-4CDC-4DA7-94F4-ADFF09CA2A72}"/>
+          </ac:picMkLst>
+        </pc:picChg>
+      </pc:sldChg>
+      <pc:sldChg chg="add del">
+        <pc:chgData name="Sandeep Prakash" userId="5b362298-5542-405f-bec6-c788e8033232" providerId="ADAL" clId="{F817BABB-CBA7-448D-9D58-A32A2DB79D75}" dt="2020-10-05T18:05:14.437" v="2772" actId="2696"/>
+        <pc:sldMkLst>
+          <pc:docMk/>
+          <pc:sldMk cId="147210099" sldId="274"/>
+        </pc:sldMkLst>
+      </pc:sldChg>
+      <pc:sldChg chg="add del">
+        <pc:chgData name="Sandeep Prakash" userId="5b362298-5542-405f-bec6-c788e8033232" providerId="ADAL" clId="{F817BABB-CBA7-448D-9D58-A32A2DB79D75}" dt="2020-10-05T18:05:09.667" v="2770" actId="2696"/>
+        <pc:sldMkLst>
+          <pc:docMk/>
+          <pc:sldMk cId="561887531" sldId="274"/>
+        </pc:sldMkLst>
+      </pc:sldChg>
+      <pc:sldChg chg="add del">
+        <pc:chgData name="Sandeep Prakash" userId="5b362298-5542-405f-bec6-c788e8033232" providerId="ADAL" clId="{F817BABB-CBA7-448D-9D58-A32A2DB79D75}" dt="2020-10-05T18:05:45.629" v="2790" actId="2696"/>
+        <pc:sldMkLst>
+          <pc:docMk/>
+          <pc:sldMk cId="826086601" sldId="274"/>
+        </pc:sldMkLst>
+      </pc:sldChg>
+      <pc:sldChg chg="modSp add ord">
+        <pc:chgData name="Sandeep Prakash" userId="5b362298-5542-405f-bec6-c788e8033232" providerId="ADAL" clId="{F817BABB-CBA7-448D-9D58-A32A2DB79D75}" dt="2020-10-05T18:05:43.248" v="2788"/>
+        <pc:sldMkLst>
+          <pc:docMk/>
+          <pc:sldMk cId="3727955727" sldId="275"/>
+        </pc:sldMkLst>
+        <pc:spChg chg="mod">
+          <ac:chgData name="Sandeep Prakash" userId="5b362298-5542-405f-bec6-c788e8033232" providerId="ADAL" clId="{F817BABB-CBA7-448D-9D58-A32A2DB79D75}" dt="2020-10-05T18:05:39.581" v="2787" actId="20577"/>
+          <ac:spMkLst>
+            <pc:docMk/>
+            <pc:sldMk cId="3727955727" sldId="275"/>
+            <ac:spMk id="2" creationId="{BB46120F-9149-410C-AF3B-9287AC93116A}"/>
+          </ac:spMkLst>
+        </pc:spChg>
       </pc:sldChg>
       <pc:sldMasterChg chg="modSldLayout">
         <pc:chgData name="Sandeep Prakash" userId="5b362298-5542-405f-bec6-c788e8033232" providerId="ADAL" clId="{F817BABB-CBA7-448D-9D58-A32A2DB79D75}" dt="2020-10-04T17:03:21.899" v="677" actId="404"/>
@@ -3316,7 +3574,7 @@
         <p:spPr>
           <a:xfrm>
             <a:off x="517126" y="1001374"/>
-            <a:ext cx="7772400" cy="675821"/>
+            <a:ext cx="7772400" cy="523220"/>
           </a:xfrm>
         </p:spPr>
         <p:txBody>
@@ -3324,13 +3582,10 @@
           <a:lstStyle/>
           <a:p>
             <a:r>
-              <a:rPr lang="nb-NO" err="1"/>
-              <a:t>Opening</a:t>
-            </a:r>
-            <a:r>
-              <a:rPr lang="nb-NO"/>
-              <a:t> slide</a:t>
-            </a:r>
+              <a:rPr lang="en-US" sz="2800" b="0" dirty="0"/>
+              <a:t>Distributed optimization using ADMM </a:t>
+            </a:r>
+            <a:endParaRPr lang="nb-NO" sz="2800" dirty="0"/>
           </a:p>
         </p:txBody>
       </p:sp>
@@ -3357,28 +3612,8 @@
           <a:lstStyle/>
           <a:p>
             <a:r>
-              <a:rPr lang="nb-NO" err="1"/>
-              <a:t>Subtitle</a:t>
-            </a:r>
-            <a:r>
-              <a:rPr lang="nb-NO"/>
-              <a:t> or </a:t>
-            </a:r>
-            <a:r>
-              <a:rPr lang="nb-NO" err="1"/>
-              <a:t>name</a:t>
-            </a:r>
-            <a:r>
-              <a:rPr lang="nb-NO"/>
-              <a:t>/date/</a:t>
-            </a:r>
-            <a:r>
-              <a:rPr lang="nb-NO" err="1"/>
-              <a:t>year</a:t>
-            </a:r>
-            <a:r>
-              <a:rPr lang="nb-NO"/>
-              <a:t> </a:t>
+              <a:rPr lang="nb-NO" sz="1800" dirty="0"/>
+              <a:t>A general approach for decomposing multi-stage NLP</a:t>
             </a:r>
           </a:p>
         </p:txBody>
@@ -3489,6 +3724,308 @@
           <p:cNvPr id="2" name="Title 1">
             <a:extLst>
               <a:ext uri="{FF2B5EF4-FFF2-40B4-BE49-F238E27FC236}">
+                <a16:creationId xmlns:a16="http://schemas.microsoft.com/office/drawing/2014/main" id="{84DD744E-F31D-4403-9249-CDDD67A00FDA}"/>
+              </a:ext>
+            </a:extLst>
+          </p:cNvPr>
+          <p:cNvSpPr>
+            <a:spLocks noGrp="1"/>
+          </p:cNvSpPr>
+          <p:nvPr>
+            <p:ph type="title"/>
+          </p:nvPr>
+        </p:nvSpPr>
+        <p:spPr/>
+        <p:txBody>
+          <a:bodyPr/>
+          <a:lstStyle/>
+          <a:p>
+            <a:r>
+              <a:rPr lang="en-US" dirty="0"/>
+              <a:t>Example – SX2,PX3</a:t>
+            </a:r>
+          </a:p>
+        </p:txBody>
+      </p:sp>
+      <p:sp>
+        <p:nvSpPr>
+          <p:cNvPr id="3" name="Content Placeholder 2">
+            <a:extLst>
+              <a:ext uri="{FF2B5EF4-FFF2-40B4-BE49-F238E27FC236}">
+                <a16:creationId xmlns:a16="http://schemas.microsoft.com/office/drawing/2014/main" id="{94C8FCE1-F2BD-4F64-90D3-F2625FA8DB0A}"/>
+              </a:ext>
+            </a:extLst>
+          </p:cNvPr>
+          <p:cNvSpPr>
+            <a:spLocks noGrp="1"/>
+          </p:cNvSpPr>
+          <p:nvPr>
+            <p:ph idx="1"/>
+          </p:nvPr>
+        </p:nvSpPr>
+        <p:spPr/>
+        <p:txBody>
+          <a:bodyPr/>
+          <a:lstStyle/>
+          <a:p>
+            <a:r>
+              <a:rPr lang="en-US" dirty="0"/>
+              <a:t>Converges fairly fast (around 50 </a:t>
+            </a:r>
+            <a:r>
+              <a:rPr lang="en-US" dirty="0" err="1"/>
+              <a:t>iters</a:t>
+            </a:r>
+            <a:r>
+              <a:rPr lang="en-US" dirty="0"/>
+              <a:t>)</a:t>
+            </a:r>
+          </a:p>
+        </p:txBody>
+      </p:sp>
+      <p:pic>
+        <p:nvPicPr>
+          <p:cNvPr id="6" name="Picture 5" descr="Chart, line chart&#10;&#10;Description automatically generated">
+            <a:extLst>
+              <a:ext uri="{FF2B5EF4-FFF2-40B4-BE49-F238E27FC236}">
+                <a16:creationId xmlns:a16="http://schemas.microsoft.com/office/drawing/2014/main" id="{7382521A-00E0-45AA-BBEA-845DB37DC04B}"/>
+              </a:ext>
+            </a:extLst>
+          </p:cNvPr>
+          <p:cNvPicPr>
+            <a:picLocks noChangeAspect="1"/>
+          </p:cNvPicPr>
+          <p:nvPr/>
+        </p:nvPicPr>
+        <p:blipFill>
+          <a:blip r:embed="rId2"/>
+          <a:stretch>
+            <a:fillRect/>
+          </a:stretch>
+        </p:blipFill>
+        <p:spPr>
+          <a:xfrm>
+            <a:off x="6251824" y="1167866"/>
+            <a:ext cx="2851771" cy="2036980"/>
+          </a:xfrm>
+          <a:prstGeom prst="rect">
+            <a:avLst/>
+          </a:prstGeom>
+        </p:spPr>
+      </p:pic>
+      <p:pic>
+        <p:nvPicPr>
+          <p:cNvPr id="8" name="Picture 7" descr="Chart, line chart&#10;&#10;Description automatically generated">
+            <a:extLst>
+              <a:ext uri="{FF2B5EF4-FFF2-40B4-BE49-F238E27FC236}">
+                <a16:creationId xmlns:a16="http://schemas.microsoft.com/office/drawing/2014/main" id="{1A830544-5FCE-4B68-B5AE-1E4223B79E58}"/>
+              </a:ext>
+            </a:extLst>
+          </p:cNvPr>
+          <p:cNvPicPr>
+            <a:picLocks noChangeAspect="1"/>
+          </p:cNvPicPr>
+          <p:nvPr/>
+        </p:nvPicPr>
+        <p:blipFill>
+          <a:blip r:embed="rId3"/>
+          <a:stretch>
+            <a:fillRect/>
+          </a:stretch>
+        </p:blipFill>
+        <p:spPr>
+          <a:xfrm>
+            <a:off x="6251825" y="3127792"/>
+            <a:ext cx="2892172" cy="2065838"/>
+          </a:xfrm>
+          <a:prstGeom prst="rect">
+            <a:avLst/>
+          </a:prstGeom>
+        </p:spPr>
+      </p:pic>
+      <p:pic>
+        <p:nvPicPr>
+          <p:cNvPr id="11" name="Picture 10" descr="Chart, line chart&#10;&#10;Description automatically generated">
+            <a:extLst>
+              <a:ext uri="{FF2B5EF4-FFF2-40B4-BE49-F238E27FC236}">
+                <a16:creationId xmlns:a16="http://schemas.microsoft.com/office/drawing/2014/main" id="{CF1E993D-B90C-4D22-BC0C-5989F73F98B3}"/>
+              </a:ext>
+            </a:extLst>
+          </p:cNvPr>
+          <p:cNvPicPr>
+            <a:picLocks noChangeAspect="1"/>
+          </p:cNvPicPr>
+          <p:nvPr/>
+        </p:nvPicPr>
+        <p:blipFill>
+          <a:blip r:embed="rId4"/>
+          <a:stretch>
+            <a:fillRect/>
+          </a:stretch>
+        </p:blipFill>
+        <p:spPr>
+          <a:xfrm>
+            <a:off x="3501355" y="1235678"/>
+            <a:ext cx="2756835" cy="1969168"/>
+          </a:xfrm>
+          <a:prstGeom prst="rect">
+            <a:avLst/>
+          </a:prstGeom>
+        </p:spPr>
+      </p:pic>
+      <p:pic>
+        <p:nvPicPr>
+          <p:cNvPr id="14" name="Picture 13" descr="Chart, line chart&#10;&#10;Description automatically generated">
+            <a:extLst>
+              <a:ext uri="{FF2B5EF4-FFF2-40B4-BE49-F238E27FC236}">
+                <a16:creationId xmlns:a16="http://schemas.microsoft.com/office/drawing/2014/main" id="{28289EDE-4CDC-4DA7-94F4-ADFF09CA2A72}"/>
+              </a:ext>
+            </a:extLst>
+          </p:cNvPr>
+          <p:cNvPicPr>
+            <a:picLocks noChangeAspect="1"/>
+          </p:cNvPicPr>
+          <p:nvPr/>
+        </p:nvPicPr>
+        <p:blipFill>
+          <a:blip r:embed="rId5"/>
+          <a:stretch>
+            <a:fillRect/>
+          </a:stretch>
+        </p:blipFill>
+        <p:spPr>
+          <a:xfrm>
+            <a:off x="3436199" y="3127792"/>
+            <a:ext cx="2821991" cy="2015708"/>
+          </a:xfrm>
+          <a:prstGeom prst="rect">
+            <a:avLst/>
+          </a:prstGeom>
+        </p:spPr>
+      </p:pic>
+    </p:spTree>
+    <p:extLst>
+      <p:ext uri="{BB962C8B-B14F-4D97-AF65-F5344CB8AC3E}">
+        <p14:creationId xmlns:p14="http://schemas.microsoft.com/office/powerpoint/2010/main" val="3008920400"/>
+      </p:ext>
+    </p:extLst>
+  </p:cSld>
+  <p:clrMapOvr>
+    <a:masterClrMapping/>
+  </p:clrMapOvr>
+</p:sld>
+</file>
+
+<file path=ppt/slides/slide11.xml><?xml version="1.0" encoding="utf-8"?>
+<p:sld xmlns:a="http://schemas.openxmlformats.org/drawingml/2006/main" xmlns:r="http://schemas.openxmlformats.org/officeDocument/2006/relationships" xmlns:p="http://schemas.openxmlformats.org/presentationml/2006/main">
+  <p:cSld>
+    <p:spTree>
+      <p:nvGrpSpPr>
+        <p:cNvPr id="1" name=""/>
+        <p:cNvGrpSpPr/>
+        <p:nvPr/>
+      </p:nvGrpSpPr>
+      <p:grpSpPr>
+        <a:xfrm>
+          <a:off x="0" y="0"/>
+          <a:ext cx="0" cy="0"/>
+          <a:chOff x="0" y="0"/>
+          <a:chExt cx="0" cy="0"/>
+        </a:xfrm>
+      </p:grpSpPr>
+      <p:sp>
+        <p:nvSpPr>
+          <p:cNvPr id="2" name="Title 1">
+            <a:extLst>
+              <a:ext uri="{FF2B5EF4-FFF2-40B4-BE49-F238E27FC236}">
+                <a16:creationId xmlns:a16="http://schemas.microsoft.com/office/drawing/2014/main" id="{BB46120F-9149-410C-AF3B-9287AC93116A}"/>
+              </a:ext>
+            </a:extLst>
+          </p:cNvPr>
+          <p:cNvSpPr>
+            <a:spLocks noGrp="1"/>
+          </p:cNvSpPr>
+          <p:nvPr>
+            <p:ph type="title"/>
+          </p:nvPr>
+        </p:nvSpPr>
+        <p:spPr>
+          <a:xfrm>
+            <a:off x="722313" y="3305176"/>
+            <a:ext cx="7772400" cy="707886"/>
+          </a:xfrm>
+        </p:spPr>
+        <p:txBody>
+          <a:bodyPr/>
+          <a:lstStyle/>
+          <a:p>
+            <a:r>
+              <a:rPr lang="en-US" dirty="0"/>
+              <a:t>BACKUP SLIDES</a:t>
+            </a:r>
+          </a:p>
+        </p:txBody>
+      </p:sp>
+      <p:sp>
+        <p:nvSpPr>
+          <p:cNvPr id="3" name="Text Placeholder 2">
+            <a:extLst>
+              <a:ext uri="{FF2B5EF4-FFF2-40B4-BE49-F238E27FC236}">
+                <a16:creationId xmlns:a16="http://schemas.microsoft.com/office/drawing/2014/main" id="{175F3A64-F28D-4C82-AA74-66C2A516FE66}"/>
+              </a:ext>
+            </a:extLst>
+          </p:cNvPr>
+          <p:cNvSpPr>
+            <a:spLocks noGrp="1"/>
+          </p:cNvSpPr>
+          <p:nvPr>
+            <p:ph type="body" idx="1"/>
+          </p:nvPr>
+        </p:nvSpPr>
+        <p:spPr/>
+        <p:txBody>
+          <a:bodyPr/>
+          <a:lstStyle/>
+          <a:p>
+            <a:endParaRPr lang="en-US"/>
+          </a:p>
+        </p:txBody>
+      </p:sp>
+    </p:spTree>
+    <p:extLst>
+      <p:ext uri="{BB962C8B-B14F-4D97-AF65-F5344CB8AC3E}">
+        <p14:creationId xmlns:p14="http://schemas.microsoft.com/office/powerpoint/2010/main" val="3727955727"/>
+      </p:ext>
+    </p:extLst>
+  </p:cSld>
+  <p:clrMapOvr>
+    <a:masterClrMapping/>
+  </p:clrMapOvr>
+</p:sld>
+</file>
+
+<file path=ppt/slides/slide12.xml><?xml version="1.0" encoding="utf-8"?>
+<p:sld xmlns:a="http://schemas.openxmlformats.org/drawingml/2006/main" xmlns:r="http://schemas.openxmlformats.org/officeDocument/2006/relationships" xmlns:p="http://schemas.openxmlformats.org/presentationml/2006/main">
+  <p:cSld>
+    <p:spTree>
+      <p:nvGrpSpPr>
+        <p:cNvPr id="1" name=""/>
+        <p:cNvGrpSpPr/>
+        <p:nvPr/>
+      </p:nvGrpSpPr>
+      <p:grpSpPr>
+        <a:xfrm>
+          <a:off x="0" y="0"/>
+          <a:ext cx="0" cy="0"/>
+          <a:chOff x="0" y="0"/>
+          <a:chExt cx="0" cy="0"/>
+        </a:xfrm>
+      </p:grpSpPr>
+      <p:sp>
+        <p:nvSpPr>
+          <p:cNvPr id="2" name="Title 1">
+            <a:extLst>
+              <a:ext uri="{FF2B5EF4-FFF2-40B4-BE49-F238E27FC236}">
                 <a16:creationId xmlns:a16="http://schemas.microsoft.com/office/drawing/2014/main" id="{E463AAA3-DCD3-4E49-AB09-32EEA338AAD8}"/>
               </a:ext>
             </a:extLst>
@@ -3546,9 +4083,12 @@
           <a:bodyPr/>
           <a:lstStyle/>
           <a:p>
-            <a:r>
-              <a:rPr lang="en-US"/>
-              <a:t>100 iterations</a:t>
+            <a:pPr marL="0" indent="0">
+              <a:buNone/>
+            </a:pPr>
+            <a:r>
+              <a:rPr lang="en-US" dirty="0"/>
+              <a:t>Sx2,Px3 case. 100 iterations</a:t>
             </a:r>
           </a:p>
         </p:txBody>
@@ -3746,7 +4286,7 @@
 </p:sld>
 </file>
 
-<file path=ppt/slides/slide11.xml><?xml version="1.0" encoding="utf-8"?>
+<file path=ppt/slides/slide13.xml><?xml version="1.0" encoding="utf-8"?>
 <p:sld xmlns:a="http://schemas.openxmlformats.org/drawingml/2006/main" xmlns:r="http://schemas.openxmlformats.org/officeDocument/2006/relationships" xmlns:p="http://schemas.openxmlformats.org/presentationml/2006/main">
   <p:cSld>
     <p:spTree>
@@ -4084,86 +4624,6 @@
 </p:sld>
 </file>
 
-<file path=ppt/slides/slide12.xml><?xml version="1.0" encoding="utf-8"?>
-<p:sld xmlns:a="http://schemas.openxmlformats.org/drawingml/2006/main" xmlns:r="http://schemas.openxmlformats.org/officeDocument/2006/relationships" xmlns:p="http://schemas.openxmlformats.org/presentationml/2006/main">
-  <p:cSld>
-    <p:spTree>
-      <p:nvGrpSpPr>
-        <p:cNvPr id="1" name=""/>
-        <p:cNvGrpSpPr/>
-        <p:nvPr/>
-      </p:nvGrpSpPr>
-      <p:grpSpPr>
-        <a:xfrm>
-          <a:off x="0" y="0"/>
-          <a:ext cx="0" cy="0"/>
-          <a:chOff x="0" y="0"/>
-          <a:chExt cx="0" cy="0"/>
-        </a:xfrm>
-      </p:grpSpPr>
-      <p:sp>
-        <p:nvSpPr>
-          <p:cNvPr id="2" name="Title 1">
-            <a:extLst>
-              <a:ext uri="{FF2B5EF4-FFF2-40B4-BE49-F238E27FC236}">
-                <a16:creationId xmlns:a16="http://schemas.microsoft.com/office/drawing/2014/main" id="{A295CAE8-EE71-468C-A29C-50964F3439D0}"/>
-              </a:ext>
-            </a:extLst>
-          </p:cNvPr>
-          <p:cNvSpPr>
-            <a:spLocks noGrp="1"/>
-          </p:cNvSpPr>
-          <p:nvPr>
-            <p:ph type="title"/>
-          </p:nvPr>
-        </p:nvSpPr>
-        <p:spPr/>
-        <p:txBody>
-          <a:bodyPr/>
-          <a:lstStyle/>
-          <a:p>
-            <a:endParaRPr lang="en-US"/>
-          </a:p>
-        </p:txBody>
-      </p:sp>
-      <p:sp>
-        <p:nvSpPr>
-          <p:cNvPr id="3" name="Content Placeholder 2">
-            <a:extLst>
-              <a:ext uri="{FF2B5EF4-FFF2-40B4-BE49-F238E27FC236}">
-                <a16:creationId xmlns:a16="http://schemas.microsoft.com/office/drawing/2014/main" id="{4C2E0B64-2A2F-44E3-878F-EECB3BFFDAD3}"/>
-              </a:ext>
-            </a:extLst>
-          </p:cNvPr>
-          <p:cNvSpPr>
-            <a:spLocks noGrp="1"/>
-          </p:cNvSpPr>
-          <p:nvPr>
-            <p:ph idx="1"/>
-          </p:nvPr>
-        </p:nvSpPr>
-        <p:spPr/>
-        <p:txBody>
-          <a:bodyPr/>
-          <a:lstStyle/>
-          <a:p>
-            <a:endParaRPr lang="en-US"/>
-          </a:p>
-        </p:txBody>
-      </p:sp>
-    </p:spTree>
-    <p:extLst>
-      <p:ext uri="{BB962C8B-B14F-4D97-AF65-F5344CB8AC3E}">
-        <p14:creationId xmlns:p14="http://schemas.microsoft.com/office/powerpoint/2010/main" val="785515841"/>
-      </p:ext>
-    </p:extLst>
-  </p:cSld>
-  <p:clrMapOvr>
-    <a:masterClrMapping/>
-  </p:clrMapOvr>
-</p:sld>
-</file>
-
 <file path=ppt/slides/slide2.xml><?xml version="1.0" encoding="utf-8"?>
 <p:sld xmlns:a="http://schemas.openxmlformats.org/drawingml/2006/main" xmlns:r="http://schemas.openxmlformats.org/officeDocument/2006/relationships" xmlns:p="http://schemas.openxmlformats.org/presentationml/2006/main">
   <p:cSld>
@@ -4956,7 +5416,7 @@
           <a:lstStyle/>
           <a:p>
             <a:r>
-              <a:rPr lang="en-US" sz="2400"/>
+              <a:rPr lang="en-US" sz="2400" dirty="0"/>
               <a:t>Example - SX1,PX3</a:t>
             </a:r>
           </a:p>
@@ -5709,7 +6169,7 @@
           <p:cNvPr id="2" name="Title 1">
             <a:extLst>
               <a:ext uri="{FF2B5EF4-FFF2-40B4-BE49-F238E27FC236}">
-                <a16:creationId xmlns:a16="http://schemas.microsoft.com/office/drawing/2014/main" id="{6DB91453-8A59-4C68-8446-66D7EE554D2B}"/>
+                <a16:creationId xmlns:a16="http://schemas.microsoft.com/office/drawing/2014/main" id="{5D3E7CC4-EC27-442F-BA09-58046DBB03D8}"/>
               </a:ext>
             </a:extLst>
           </p:cNvPr>
@@ -5725,7 +6185,10 @@
           <a:bodyPr/>
           <a:lstStyle/>
           <a:p>
-            <a:endParaRPr lang="en-US"/>
+            <a:r>
+              <a:rPr lang="en-US" dirty="0"/>
+              <a:t>2 rho’s</a:t>
+            </a:r>
           </a:p>
         </p:txBody>
       </p:sp>
@@ -5734,7 +6197,7 @@
           <p:cNvPr id="3" name="Content Placeholder 2">
             <a:extLst>
               <a:ext uri="{FF2B5EF4-FFF2-40B4-BE49-F238E27FC236}">
-                <a16:creationId xmlns:a16="http://schemas.microsoft.com/office/drawing/2014/main" id="{4D2BDDF8-81EC-4E58-9083-623568F6A947}"/>
+                <a16:creationId xmlns:a16="http://schemas.microsoft.com/office/drawing/2014/main" id="{9D6F03DC-621B-4568-9468-5811EF9BE1CB}"/>
               </a:ext>
             </a:extLst>
           </p:cNvPr>
@@ -5750,14 +6213,146 @@
           <a:bodyPr/>
           <a:lstStyle/>
           <a:p>
-            <a:endParaRPr lang="en-US"/>
+            <a:pPr marL="0" indent="0">
+              <a:buNone/>
+            </a:pPr>
+            <a:r>
+              <a:rPr lang="en-US" dirty="0"/>
+              <a:t>Convergence tuned to be much faster</a:t>
+            </a:r>
+          </a:p>
+          <a:p>
+            <a:r>
+              <a:rPr lang="en-US" sz="1200" dirty="0"/>
+              <a:t>According to lagrange multiplier magnitudes</a:t>
+            </a:r>
           </a:p>
         </p:txBody>
       </p:sp>
+      <p:pic>
+        <p:nvPicPr>
+          <p:cNvPr id="6" name="Picture 5" descr="Chart, line chart&#10;&#10;Description automatically generated">
+            <a:extLst>
+              <a:ext uri="{FF2B5EF4-FFF2-40B4-BE49-F238E27FC236}">
+                <a16:creationId xmlns:a16="http://schemas.microsoft.com/office/drawing/2014/main" id="{973A046E-5EA9-4269-BF4E-1266B3C53CEC}"/>
+              </a:ext>
+            </a:extLst>
+          </p:cNvPr>
+          <p:cNvPicPr>
+            <a:picLocks noChangeAspect="1"/>
+          </p:cNvPicPr>
+          <p:nvPr/>
+        </p:nvPicPr>
+        <p:blipFill>
+          <a:blip r:embed="rId2"/>
+          <a:stretch>
+            <a:fillRect/>
+          </a:stretch>
+        </p:blipFill>
+        <p:spPr>
+          <a:xfrm>
+            <a:off x="6482974" y="1384745"/>
+            <a:ext cx="2661025" cy="1900732"/>
+          </a:xfrm>
+          <a:prstGeom prst="rect">
+            <a:avLst/>
+          </a:prstGeom>
+        </p:spPr>
+      </p:pic>
+      <p:pic>
+        <p:nvPicPr>
+          <p:cNvPr id="15" name="Picture 14" descr="Chart, line chart&#10;&#10;Description automatically generated">
+            <a:extLst>
+              <a:ext uri="{FF2B5EF4-FFF2-40B4-BE49-F238E27FC236}">
+                <a16:creationId xmlns:a16="http://schemas.microsoft.com/office/drawing/2014/main" id="{444F4641-E084-446C-A037-5F6E19372174}"/>
+              </a:ext>
+            </a:extLst>
+          </p:cNvPr>
+          <p:cNvPicPr>
+            <a:picLocks noChangeAspect="1"/>
+          </p:cNvPicPr>
+          <p:nvPr/>
+        </p:nvPicPr>
+        <p:blipFill>
+          <a:blip r:embed="rId3"/>
+          <a:stretch>
+            <a:fillRect/>
+          </a:stretch>
+        </p:blipFill>
+        <p:spPr>
+          <a:xfrm>
+            <a:off x="3682906" y="3208020"/>
+            <a:ext cx="2709672" cy="1935480"/>
+          </a:xfrm>
+          <a:prstGeom prst="rect">
+            <a:avLst/>
+          </a:prstGeom>
+        </p:spPr>
+      </p:pic>
+      <p:pic>
+        <p:nvPicPr>
+          <p:cNvPr id="18" name="Picture 17" descr="Chart&#10;&#10;Description automatically generated">
+            <a:extLst>
+              <a:ext uri="{FF2B5EF4-FFF2-40B4-BE49-F238E27FC236}">
+                <a16:creationId xmlns:a16="http://schemas.microsoft.com/office/drawing/2014/main" id="{4668F48C-F399-4803-A7CA-4FE1EA2B3C18}"/>
+              </a:ext>
+            </a:extLst>
+          </p:cNvPr>
+          <p:cNvPicPr>
+            <a:picLocks noChangeAspect="1"/>
+          </p:cNvPicPr>
+          <p:nvPr/>
+        </p:nvPicPr>
+        <p:blipFill>
+          <a:blip r:embed="rId4"/>
+          <a:stretch>
+            <a:fillRect/>
+          </a:stretch>
+        </p:blipFill>
+        <p:spPr>
+          <a:xfrm>
+            <a:off x="3731554" y="1376411"/>
+            <a:ext cx="2661024" cy="1900732"/>
+          </a:xfrm>
+          <a:prstGeom prst="rect">
+            <a:avLst/>
+          </a:prstGeom>
+        </p:spPr>
+      </p:pic>
+      <p:pic>
+        <p:nvPicPr>
+          <p:cNvPr id="9" name="Picture 8" descr="Chart, line chart&#10;&#10;Description automatically generated">
+            <a:extLst>
+              <a:ext uri="{FF2B5EF4-FFF2-40B4-BE49-F238E27FC236}">
+                <a16:creationId xmlns:a16="http://schemas.microsoft.com/office/drawing/2014/main" id="{6884FBAB-8D23-446B-BCF0-52560A74BA00}"/>
+              </a:ext>
+            </a:extLst>
+          </p:cNvPr>
+          <p:cNvPicPr>
+            <a:picLocks noChangeAspect="1"/>
+          </p:cNvPicPr>
+          <p:nvPr/>
+        </p:nvPicPr>
+        <p:blipFill>
+          <a:blip r:embed="rId5"/>
+          <a:stretch>
+            <a:fillRect/>
+          </a:stretch>
+        </p:blipFill>
+        <p:spPr>
+          <a:xfrm>
+            <a:off x="6392578" y="3195908"/>
+            <a:ext cx="2751422" cy="1965302"/>
+          </a:xfrm>
+          <a:prstGeom prst="rect">
+            <a:avLst/>
+          </a:prstGeom>
+        </p:spPr>
+      </p:pic>
     </p:spTree>
     <p:extLst>
       <p:ext uri="{BB962C8B-B14F-4D97-AF65-F5344CB8AC3E}">
-        <p14:creationId xmlns:p14="http://schemas.microsoft.com/office/powerpoint/2010/main" val="1448095239"/>
+        <p14:creationId xmlns:p14="http://schemas.microsoft.com/office/powerpoint/2010/main" val="3394912370"/>
       </p:ext>
     </p:extLst>
   </p:cSld>
@@ -6111,18 +6706,18 @@
 </file>
 
 <file path=customXml/item1.xml><?xml version="1.0" encoding="utf-8"?>
-<p:properties xmlns:p="http://schemas.microsoft.com/office/2006/metadata/properties" xmlns:xsi="http://www.w3.org/2001/XMLSchema-instance" xmlns:pc="http://schemas.microsoft.com/office/infopath/2007/PartnerControls">
-  <documentManagement/>
-</p:properties>
-</file>
-
-<file path=customXml/item2.xml><?xml version="1.0" encoding="utf-8"?>
 <?mso-contentType ?>
 <FormTemplates xmlns="http://schemas.microsoft.com/sharepoint/v3/contenttype/forms">
   <Display>DocumentLibraryForm</Display>
   <Edit>DocumentLibraryForm</Edit>
   <New>DocumentLibraryForm</New>
 </FormTemplates>
+</file>
+
+<file path=customXml/item2.xml><?xml version="1.0" encoding="utf-8"?>
+<p:properties xmlns:p="http://schemas.microsoft.com/office/2006/metadata/properties" xmlns:xsi="http://www.w3.org/2001/XMLSchema-instance" xmlns:pc="http://schemas.microsoft.com/office/infopath/2007/PartnerControls">
+  <documentManagement/>
+</p:properties>
 </file>
 
 <file path=customXml/item3.xml><?xml version="1.0" encoding="utf-8"?>
@@ -6304,6 +6899,14 @@
 </file>
 
 <file path=customXml/itemProps1.xml><?xml version="1.0" encoding="utf-8"?>
+<ds:datastoreItem xmlns:ds="http://schemas.openxmlformats.org/officeDocument/2006/customXml" ds:itemID="{938E7945-E5DA-4D47-88B8-516D67DFC100}">
+  <ds:schemaRefs>
+    <ds:schemaRef ds:uri="http://schemas.microsoft.com/sharepoint/v3/contenttype/forms"/>
+  </ds:schemaRefs>
+</ds:datastoreItem>
+</file>
+
+<file path=customXml/itemProps2.xml><?xml version="1.0" encoding="utf-8"?>
 <ds:datastoreItem xmlns:ds="http://schemas.openxmlformats.org/officeDocument/2006/customXml" ds:itemID="{CC65EBA1-506D-4222-9657-0050D9B8735B}">
   <ds:schemaRefs>
     <ds:schemaRef ds:uri="http://schemas.microsoft.com/office/2006/metadata/properties"/>
@@ -6312,28 +6915,20 @@
 </ds:datastoreItem>
 </file>
 
-<file path=customXml/itemProps2.xml><?xml version="1.0" encoding="utf-8"?>
-<ds:datastoreItem xmlns:ds="http://schemas.openxmlformats.org/officeDocument/2006/customXml" ds:itemID="{938E7945-E5DA-4D47-88B8-516D67DFC100}">
-  <ds:schemaRefs>
-    <ds:schemaRef ds:uri="http://schemas.microsoft.com/sharepoint/v3/contenttype/forms"/>
-  </ds:schemaRefs>
-</ds:datastoreItem>
-</file>
-
 <file path=customXml/itemProps3.xml><?xml version="1.0" encoding="utf-8"?>
 <ds:datastoreItem xmlns:ds="http://schemas.openxmlformats.org/officeDocument/2006/customXml" ds:itemID="{16ABB917-64F5-4455-B053-B6C53509B72E}">
   <ds:schemaRefs>
+    <ds:schemaRef ds:uri="http://schemas.microsoft.com/office/2006/metadata/contentType"/>
+    <ds:schemaRef ds:uri="http://schemas.microsoft.com/office/2006/metadata/properties/metaAttributes"/>
+    <ds:schemaRef ds:uri="http://www.w3.org/2001/XMLSchema"/>
+    <ds:schemaRef ds:uri="http://schemas.microsoft.com/office/2006/metadata/properties"/>
     <ds:schemaRef ds:uri="6000e060-03b8-4b5a-b938-e5b3a17c162b"/>
+    <ds:schemaRef ds:uri="http://schemas.microsoft.com/office/2006/documentManagement/types"/>
+    <ds:schemaRef ds:uri="http://schemas.microsoft.com/office/infopath/2007/PartnerControls"/>
+    <ds:schemaRef ds:uri="http://schemas.openxmlformats.org/package/2006/metadata/core-properties"/>
     <ds:schemaRef ds:uri="http://purl.org/dc/elements/1.1/"/>
     <ds:schemaRef ds:uri="http://purl.org/dc/terms/"/>
     <ds:schemaRef ds:uri="http://schemas.microsoft.com/internal/obd"/>
-    <ds:schemaRef ds:uri="http://schemas.microsoft.com/office/2006/documentManagement/types"/>
-    <ds:schemaRef ds:uri="http://schemas.microsoft.com/office/2006/metadata/contentType"/>
-    <ds:schemaRef ds:uri="http://schemas.microsoft.com/office/2006/metadata/properties"/>
-    <ds:schemaRef ds:uri="http://schemas.microsoft.com/office/2006/metadata/properties/metaAttributes"/>
-    <ds:schemaRef ds:uri="http://schemas.microsoft.com/office/infopath/2007/PartnerControls"/>
-    <ds:schemaRef ds:uri="http://schemas.openxmlformats.org/package/2006/metadata/core-properties"/>
-    <ds:schemaRef ds:uri="http://www.w3.org/2001/XMLSchema"/>
   </ds:schemaRefs>
 </ds:datastoreItem>
 </file>
</xml_diff>